<commit_message>
removed the results on recycling from the pptx and xlsx files
</commit_message>
<xml_diff>
--- a/baseline/2slides_for_Berber/2slides_for_Berber.pptx
+++ b/baseline/2slides_for_Berber/2slides_for_Berber.pptx
@@ -116,9 +116,117 @@
 <file path=ppt/revisionInfo.xml><?xml version="1.0" encoding="utf-8"?>
 <p1510:revInfo xmlns:a="http://schemas.openxmlformats.org/drawingml/2006/main" xmlns:r="http://schemas.openxmlformats.org/officeDocument/2006/relationships" xmlns:p1510="http://schemas.microsoft.com/office/powerpoint/2015/10/main">
   <p1510:revLst>
-    <p1510:client id="{D6B5140D-A68F-4797-87C2-577373A9C582}" v="65" dt="2023-04-20T11:29:10.261"/>
+    <p1510:client id="{B23580D5-BD83-4CA4-ADF4-90C6ADECBAF0}" v="9" dt="2023-04-21T16:32:49.216"/>
   </p1510:revLst>
 </p1510:revInfo>
+</file>
+
+<file path=ppt/changesInfos/changesInfo1.xml><?xml version="1.0" encoding="utf-8"?>
+<pc:chgInfo xmlns:a="http://schemas.openxmlformats.org/drawingml/2006/main" xmlns:r="http://schemas.openxmlformats.org/officeDocument/2006/relationships" xmlns:ac="http://schemas.microsoft.com/office/drawing/2013/main/command" xmlns:pc="http://schemas.microsoft.com/office/powerpoint/2013/main/command">
+  <pc:docChgLst>
+    <pc:chgData name="Nabwire, Leocardia (IFPRI-Kampala)" userId="4f148910-3439-4c49-8a23-2f228d37750e" providerId="ADAL" clId="{B23580D5-BD83-4CA4-ADF4-90C6ADECBAF0}"/>
+    <pc:docChg chg="custSel modSld">
+      <pc:chgData name="Nabwire, Leocardia (IFPRI-Kampala)" userId="4f148910-3439-4c49-8a23-2f228d37750e" providerId="ADAL" clId="{B23580D5-BD83-4CA4-ADF4-90C6ADECBAF0}" dt="2023-04-21T16:36:43.498" v="396" actId="20577"/>
+      <pc:docMkLst>
+        <pc:docMk/>
+      </pc:docMkLst>
+      <pc:sldChg chg="addSp delSp modSp mod">
+        <pc:chgData name="Nabwire, Leocardia (IFPRI-Kampala)" userId="4f148910-3439-4c49-8a23-2f228d37750e" providerId="ADAL" clId="{B23580D5-BD83-4CA4-ADF4-90C6ADECBAF0}" dt="2023-04-21T16:32:49.216" v="216" actId="207"/>
+        <pc:sldMkLst>
+          <pc:docMk/>
+          <pc:sldMk cId="778510539" sldId="258"/>
+        </pc:sldMkLst>
+        <pc:spChg chg="mod">
+          <ac:chgData name="Nabwire, Leocardia (IFPRI-Kampala)" userId="4f148910-3439-4c49-8a23-2f228d37750e" providerId="ADAL" clId="{B23580D5-BD83-4CA4-ADF4-90C6ADECBAF0}" dt="2023-04-21T16:30:14.614" v="202" actId="1036"/>
+          <ac:spMkLst>
+            <pc:docMk/>
+            <pc:sldMk cId="778510539" sldId="258"/>
+            <ac:spMk id="8" creationId="{F0026985-EF43-255E-30FE-DC58C18E25DD}"/>
+          </ac:spMkLst>
+        </pc:spChg>
+        <pc:graphicFrameChg chg="add del mod">
+          <ac:chgData name="Nabwire, Leocardia (IFPRI-Kampala)" userId="4f148910-3439-4c49-8a23-2f228d37750e" providerId="ADAL" clId="{B23580D5-BD83-4CA4-ADF4-90C6ADECBAF0}" dt="2023-04-21T16:27:36.404" v="80" actId="478"/>
+          <ac:graphicFrameMkLst>
+            <pc:docMk/>
+            <pc:sldMk cId="778510539" sldId="258"/>
+            <ac:graphicFrameMk id="3" creationId="{A88FD49A-429B-6F93-8031-0AB830B44790}"/>
+          </ac:graphicFrameMkLst>
+        </pc:graphicFrameChg>
+        <pc:graphicFrameChg chg="add mod">
+          <ac:chgData name="Nabwire, Leocardia (IFPRI-Kampala)" userId="4f148910-3439-4c49-8a23-2f228d37750e" providerId="ADAL" clId="{B23580D5-BD83-4CA4-ADF4-90C6ADECBAF0}" dt="2023-04-21T16:32:49.216" v="216" actId="207"/>
+          <ac:graphicFrameMkLst>
+            <pc:docMk/>
+            <pc:sldMk cId="778510539" sldId="258"/>
+            <ac:graphicFrameMk id="4" creationId="{A88FD49A-429B-6F93-8031-0AB830B44790}"/>
+          </ac:graphicFrameMkLst>
+        </pc:graphicFrameChg>
+        <pc:graphicFrameChg chg="del">
+          <ac:chgData name="Nabwire, Leocardia (IFPRI-Kampala)" userId="4f148910-3439-4c49-8a23-2f228d37750e" providerId="ADAL" clId="{B23580D5-BD83-4CA4-ADF4-90C6ADECBAF0}" dt="2023-04-21T16:25:22.755" v="0" actId="478"/>
+          <ac:graphicFrameMkLst>
+            <pc:docMk/>
+            <pc:sldMk cId="778510539" sldId="258"/>
+            <ac:graphicFrameMk id="6" creationId="{A88FD49A-429B-6F93-8031-0AB830B44790}"/>
+          </ac:graphicFrameMkLst>
+        </pc:graphicFrameChg>
+        <pc:graphicFrameChg chg="mod">
+          <ac:chgData name="Nabwire, Leocardia (IFPRI-Kampala)" userId="4f148910-3439-4c49-8a23-2f228d37750e" providerId="ADAL" clId="{B23580D5-BD83-4CA4-ADF4-90C6ADECBAF0}" dt="2023-04-21T16:30:49.505" v="212" actId="1036"/>
+          <ac:graphicFrameMkLst>
+            <pc:docMk/>
+            <pc:sldMk cId="778510539" sldId="258"/>
+            <ac:graphicFrameMk id="11" creationId="{52A3E50C-F2A9-5DCA-7328-9138080B5592}"/>
+          </ac:graphicFrameMkLst>
+        </pc:graphicFrameChg>
+        <pc:graphicFrameChg chg="mod modGraphic">
+          <ac:chgData name="Nabwire, Leocardia (IFPRI-Kampala)" userId="4f148910-3439-4c49-8a23-2f228d37750e" providerId="ADAL" clId="{B23580D5-BD83-4CA4-ADF4-90C6ADECBAF0}" dt="2023-04-21T16:32:17.355" v="214" actId="798"/>
+          <ac:graphicFrameMkLst>
+            <pc:docMk/>
+            <pc:sldMk cId="778510539" sldId="258"/>
+            <ac:graphicFrameMk id="15" creationId="{E8729533-ECAB-6C71-D0C6-FF9442BD74AF}"/>
+          </ac:graphicFrameMkLst>
+        </pc:graphicFrameChg>
+      </pc:sldChg>
+      <pc:sldChg chg="modSp mod">
+        <pc:chgData name="Nabwire, Leocardia (IFPRI-Kampala)" userId="4f148910-3439-4c49-8a23-2f228d37750e" providerId="ADAL" clId="{B23580D5-BD83-4CA4-ADF4-90C6ADECBAF0}" dt="2023-04-21T16:36:43.498" v="396" actId="20577"/>
+        <pc:sldMkLst>
+          <pc:docMk/>
+          <pc:sldMk cId="1592359018" sldId="259"/>
+        </pc:sldMkLst>
+        <pc:spChg chg="mod">
+          <ac:chgData name="Nabwire, Leocardia (IFPRI-Kampala)" userId="4f148910-3439-4c49-8a23-2f228d37750e" providerId="ADAL" clId="{B23580D5-BD83-4CA4-ADF4-90C6ADECBAF0}" dt="2023-04-21T16:34:08.614" v="258" actId="20577"/>
+          <ac:spMkLst>
+            <pc:docMk/>
+            <pc:sldMk cId="1592359018" sldId="259"/>
+            <ac:spMk id="2" creationId="{43917F4C-29CC-AB68-AF56-1EF56DBCF933}"/>
+          </ac:spMkLst>
+        </pc:spChg>
+        <pc:spChg chg="mod">
+          <ac:chgData name="Nabwire, Leocardia (IFPRI-Kampala)" userId="4f148910-3439-4c49-8a23-2f228d37750e" providerId="ADAL" clId="{B23580D5-BD83-4CA4-ADF4-90C6ADECBAF0}" dt="2023-04-21T16:34:48.620" v="275" actId="20577"/>
+          <ac:spMkLst>
+            <pc:docMk/>
+            <pc:sldMk cId="1592359018" sldId="259"/>
+            <ac:spMk id="8" creationId="{AFC74D18-D675-B2D9-4EF3-6DF505EA773A}"/>
+          </ac:spMkLst>
+        </pc:spChg>
+        <pc:spChg chg="mod">
+          <ac:chgData name="Nabwire, Leocardia (IFPRI-Kampala)" userId="4f148910-3439-4c49-8a23-2f228d37750e" providerId="ADAL" clId="{B23580D5-BD83-4CA4-ADF4-90C6ADECBAF0}" dt="2023-04-21T16:36:03.104" v="375" actId="207"/>
+          <ac:spMkLst>
+            <pc:docMk/>
+            <pc:sldMk cId="1592359018" sldId="259"/>
+            <ac:spMk id="13" creationId="{C16E9BE2-BAEE-05AC-7ED3-1A03444F98FC}"/>
+          </ac:spMkLst>
+        </pc:spChg>
+        <pc:spChg chg="mod">
+          <ac:chgData name="Nabwire, Leocardia (IFPRI-Kampala)" userId="4f148910-3439-4c49-8a23-2f228d37750e" providerId="ADAL" clId="{B23580D5-BD83-4CA4-ADF4-90C6ADECBAF0}" dt="2023-04-21T16:36:43.498" v="396" actId="20577"/>
+          <ac:spMkLst>
+            <pc:docMk/>
+            <pc:sldMk cId="1592359018" sldId="259"/>
+            <ac:spMk id="15" creationId="{42935C1F-3C14-419B-0FED-C5722B1D7BDE}"/>
+          </ac:spMkLst>
+        </pc:spChg>
+      </pc:sldChg>
+    </pc:docChg>
+  </pc:docChgLst>
+</pc:chgInfo>
 </file>
 
 <file path=ppt/charts/chart1.xml><?xml version="1.0" encoding="utf-8"?>
@@ -142,7 +250,7 @@
           <a:lstStyle/>
           <a:p>
             <a:pPr>
-              <a:defRPr sz="1400" b="0" i="0" u="none" strike="noStrike" kern="1200" spc="0" baseline="0">
+              <a:defRPr sz="1260" b="1" i="0" u="none" strike="noStrike" kern="1200" spc="0" baseline="0">
                 <a:solidFill>
                   <a:schemeClr val="tx1">
                     <a:lumMod val="65000"/>
@@ -155,7 +263,11 @@
               </a:defRPr>
             </a:pPr>
             <a:r>
-              <a:rPr lang="en-US" sz="1100" b="1"/>
+              <a:rPr lang="en-US" sz="1400" b="1" dirty="0">
+                <a:solidFill>
+                  <a:schemeClr val="accent2"/>
+                </a:solidFill>
+              </a:rPr>
               <a:t>Use of improved maize varieties at baseline</a:t>
             </a:r>
           </a:p>
@@ -174,7 +286,7 @@
         <a:lstStyle/>
         <a:p>
           <a:pPr>
-            <a:defRPr sz="1400" b="0" i="0" u="none" strike="noStrike" kern="1200" spc="0" baseline="0">
+            <a:defRPr sz="1260" b="1" i="0" u="none" strike="noStrike" kern="1200" spc="0" baseline="0">
               <a:solidFill>
                 <a:schemeClr val="tx1">
                   <a:lumMod val="65000"/>
@@ -202,7 +314,7 @@
           <c:order val="0"/>
           <c:tx>
             <c:strRef>
-              <c:f>'1st slide (2)'!$C$2</c:f>
+              <c:f>'1st slide'!$C$2</c:f>
               <c:strCache>
                 <c:ptCount val="1"/>
                 <c:pt idx="0">
@@ -230,13 +342,11 @@
               <a:effectLst/>
             </c:spPr>
             <c:txPr>
-              <a:bodyPr rot="0" spcFirstLastPara="1" vertOverflow="ellipsis" vert="horz" wrap="square" lIns="38100" tIns="19050" rIns="38100" bIns="19050" anchor="ctr" anchorCtr="1">
-                <a:spAutoFit/>
-              </a:bodyPr>
+              <a:bodyPr rot="0" spcFirstLastPara="1" vertOverflow="ellipsis" vert="horz" wrap="square" anchor="ctr" anchorCtr="1"/>
               <a:lstStyle/>
               <a:p>
                 <a:pPr>
-                  <a:defRPr sz="900" b="0" i="0" u="none" strike="noStrike" kern="1200" baseline="0">
+                  <a:defRPr sz="1050" b="0" i="0" u="none" strike="noStrike" kern="1200" baseline="0">
                     <a:solidFill>
                       <a:schemeClr val="tx1">
                         <a:lumMod val="75000"/>
@@ -280,9 +390,9 @@
           </c:dLbls>
           <c:cat>
             <c:multiLvlStrRef>
-              <c:f>'1st slide (2)'!$A$3:$B$11</c:f>
+              <c:f>'1st slide'!$A$3:$B$8</c:f>
               <c:multiLvlStrCache>
-                <c:ptCount val="9"/>
+                <c:ptCount val="6"/>
                 <c:lvl>
                   <c:pt idx="0">
                     <c:v>All improved varieties</c:v>
@@ -302,15 +412,6 @@
                   <c:pt idx="5">
                     <c:v>OPVs only</c:v>
                   </c:pt>
-                  <c:pt idx="6">
-                    <c:v>All improved varieties</c:v>
-                  </c:pt>
-                  <c:pt idx="7">
-                    <c:v>Hybrids only</c:v>
-                  </c:pt>
-                  <c:pt idx="8">
-                    <c:v>OPVs only</c:v>
-                  </c:pt>
                 </c:lvl>
                 <c:lvl>
                   <c:pt idx="0">
@@ -319,19 +420,17 @@
                   <c:pt idx="3">
                     <c:v>Number of years the farmer has used the variety</c:v>
                   </c:pt>
-                  <c:pt idx="6">
-                    <c:v>% of farmers who recycle seed more than the recommended (0 times for hydrids &amp; 3 times for OPVs)</c:v>
-                  </c:pt>
                 </c:lvl>
               </c:multiLvlStrCache>
+              <c:extLst/>
             </c:multiLvlStrRef>
           </c:cat>
           <c:val>
             <c:numRef>
-              <c:f>'1st slide (2)'!$C$3:$C$11</c:f>
+              <c:f>'1st slide'!$C$3:$C$8</c:f>
               <c:numCache>
                 <c:formatCode>0</c:formatCode>
-                <c:ptCount val="9"/>
+                <c:ptCount val="6"/>
                 <c:pt idx="0">
                   <c:v>40.299999999999997</c:v>
                 </c:pt>
@@ -350,21 +449,13 @@
                 <c:pt idx="5">
                   <c:v>13.62</c:v>
                 </c:pt>
-                <c:pt idx="6">
-                  <c:v>91.66</c:v>
-                </c:pt>
-                <c:pt idx="7">
-                  <c:v>99.1</c:v>
-                </c:pt>
-                <c:pt idx="8">
-                  <c:v>77.06</c:v>
-                </c:pt>
               </c:numCache>
+              <c:extLst/>
             </c:numRef>
           </c:val>
           <c:extLst>
             <c:ext xmlns:c16="http://schemas.microsoft.com/office/drawing/2014/chart" uri="{C3380CC4-5D6E-409C-BE32-E72D297353CC}">
-              <c16:uniqueId val="{00000000-02DD-4396-88D6-A814278DDB6B}"/>
+              <c16:uniqueId val="{00000000-2467-4A75-B78E-287C97D59854}"/>
             </c:ext>
           </c:extLst>
         </c:ser>
@@ -373,7 +464,7 @@
           <c:order val="1"/>
           <c:tx>
             <c:strRef>
-              <c:f>'1st slide (2)'!$D$2</c:f>
+              <c:f>'1st slide'!$D$2</c:f>
               <c:strCache>
                 <c:ptCount val="1"/>
                 <c:pt idx="0">
@@ -401,13 +492,11 @@
               <a:effectLst/>
             </c:spPr>
             <c:txPr>
-              <a:bodyPr rot="0" spcFirstLastPara="1" vertOverflow="ellipsis" vert="horz" wrap="square" lIns="38100" tIns="19050" rIns="38100" bIns="19050" anchor="ctr" anchorCtr="1">
-                <a:spAutoFit/>
-              </a:bodyPr>
+              <a:bodyPr rot="0" spcFirstLastPara="1" vertOverflow="ellipsis" vert="horz" wrap="square" anchor="ctr" anchorCtr="1"/>
               <a:lstStyle/>
               <a:p>
                 <a:pPr>
-                  <a:defRPr sz="900" b="0" i="0" u="none" strike="noStrike" kern="1200" baseline="0">
+                  <a:defRPr sz="1050" b="0" i="0" u="none" strike="noStrike" kern="1200" baseline="0">
                     <a:solidFill>
                       <a:schemeClr val="tx1">
                         <a:lumMod val="75000"/>
@@ -451,9 +540,9 @@
           </c:dLbls>
           <c:cat>
             <c:multiLvlStrRef>
-              <c:f>'1st slide (2)'!$A$3:$B$11</c:f>
+              <c:f>'1st slide'!$A$3:$B$8</c:f>
               <c:multiLvlStrCache>
-                <c:ptCount val="9"/>
+                <c:ptCount val="6"/>
                 <c:lvl>
                   <c:pt idx="0">
                     <c:v>All improved varieties</c:v>
@@ -473,15 +562,6 @@
                   <c:pt idx="5">
                     <c:v>OPVs only</c:v>
                   </c:pt>
-                  <c:pt idx="6">
-                    <c:v>All improved varieties</c:v>
-                  </c:pt>
-                  <c:pt idx="7">
-                    <c:v>Hybrids only</c:v>
-                  </c:pt>
-                  <c:pt idx="8">
-                    <c:v>OPVs only</c:v>
-                  </c:pt>
                 </c:lvl>
                 <c:lvl>
                   <c:pt idx="0">
@@ -490,19 +570,17 @@
                   <c:pt idx="3">
                     <c:v>Number of years the farmer has used the variety</c:v>
                   </c:pt>
-                  <c:pt idx="6">
-                    <c:v>% of farmers who recycle seed more than the recommended (0 times for hydrids &amp; 3 times for OPVs)</c:v>
-                  </c:pt>
                 </c:lvl>
               </c:multiLvlStrCache>
+              <c:extLst/>
             </c:multiLvlStrRef>
           </c:cat>
           <c:val>
             <c:numRef>
-              <c:f>'1st slide (2)'!$D$3:$D$11</c:f>
+              <c:f>'1st slide'!$D$3:$D$8</c:f>
               <c:numCache>
                 <c:formatCode>0</c:formatCode>
-                <c:ptCount val="9"/>
+                <c:ptCount val="6"/>
                 <c:pt idx="0">
                   <c:v>26.11</c:v>
                 </c:pt>
@@ -521,21 +599,13 @@
                 <c:pt idx="5">
                   <c:v>4.09</c:v>
                 </c:pt>
-                <c:pt idx="6">
-                  <c:v>86.81</c:v>
-                </c:pt>
-                <c:pt idx="7">
-                  <c:v>98.9</c:v>
-                </c:pt>
-                <c:pt idx="8">
-                  <c:v>66.040000000000006</c:v>
-                </c:pt>
               </c:numCache>
+              <c:extLst/>
             </c:numRef>
           </c:val>
           <c:extLst>
             <c:ext xmlns:c16="http://schemas.microsoft.com/office/drawing/2014/chart" uri="{C3380CC4-5D6E-409C-BE32-E72D297353CC}">
-              <c16:uniqueId val="{00000001-02DD-4396-88D6-A814278DDB6B}"/>
+              <c16:uniqueId val="{00000001-2467-4A75-B78E-287C97D59854}"/>
             </c:ext>
           </c:extLst>
         </c:ser>
@@ -544,7 +614,7 @@
           <c:order val="2"/>
           <c:tx>
             <c:strRef>
-              <c:f>'1st slide (2)'!$E$2</c:f>
+              <c:f>'1st slide'!$E$2</c:f>
               <c:strCache>
                 <c:ptCount val="1"/>
                 <c:pt idx="0">
@@ -572,13 +642,11 @@
               <a:effectLst/>
             </c:spPr>
             <c:txPr>
-              <a:bodyPr rot="0" spcFirstLastPara="1" vertOverflow="ellipsis" vert="horz" wrap="square" lIns="38100" tIns="19050" rIns="38100" bIns="19050" anchor="ctr" anchorCtr="1">
-                <a:spAutoFit/>
-              </a:bodyPr>
+              <a:bodyPr rot="0" spcFirstLastPara="1" vertOverflow="ellipsis" vert="horz" wrap="square" anchor="ctr" anchorCtr="1"/>
               <a:lstStyle/>
               <a:p>
                 <a:pPr>
-                  <a:defRPr sz="900" b="0" i="0" u="none" strike="noStrike" kern="1200" baseline="0">
+                  <a:defRPr sz="1050" b="0" i="0" u="none" strike="noStrike" kern="1200" baseline="0">
                     <a:solidFill>
                       <a:schemeClr val="tx1">
                         <a:lumMod val="75000"/>
@@ -622,9 +690,9 @@
           </c:dLbls>
           <c:cat>
             <c:multiLvlStrRef>
-              <c:f>'1st slide (2)'!$A$3:$B$11</c:f>
+              <c:f>'1st slide'!$A$3:$B$8</c:f>
               <c:multiLvlStrCache>
-                <c:ptCount val="9"/>
+                <c:ptCount val="6"/>
                 <c:lvl>
                   <c:pt idx="0">
                     <c:v>All improved varieties</c:v>
@@ -644,15 +712,6 @@
                   <c:pt idx="5">
                     <c:v>OPVs only</c:v>
                   </c:pt>
-                  <c:pt idx="6">
-                    <c:v>All improved varieties</c:v>
-                  </c:pt>
-                  <c:pt idx="7">
-                    <c:v>Hybrids only</c:v>
-                  </c:pt>
-                  <c:pt idx="8">
-                    <c:v>OPVs only</c:v>
-                  </c:pt>
                 </c:lvl>
                 <c:lvl>
                   <c:pt idx="0">
@@ -661,19 +720,17 @@
                   <c:pt idx="3">
                     <c:v>Number of years the farmer has used the variety</c:v>
                   </c:pt>
-                  <c:pt idx="6">
-                    <c:v>% of farmers who recycle seed more than the recommended (0 times for hydrids &amp; 3 times for OPVs)</c:v>
-                  </c:pt>
                 </c:lvl>
               </c:multiLvlStrCache>
+              <c:extLst/>
             </c:multiLvlStrRef>
           </c:cat>
           <c:val>
             <c:numRef>
-              <c:f>'1st slide (2)'!$E$3:$E$11</c:f>
+              <c:f>'1st slide'!$E$3:$E$8</c:f>
               <c:numCache>
                 <c:formatCode>0</c:formatCode>
-                <c:ptCount val="9"/>
+                <c:ptCount val="6"/>
                 <c:pt idx="0">
                   <c:v>43.96</c:v>
                 </c:pt>
@@ -692,21 +749,13 @@
                 <c:pt idx="5">
                   <c:v>15.38</c:v>
                 </c:pt>
-                <c:pt idx="6">
-                  <c:v>92.47</c:v>
-                </c:pt>
-                <c:pt idx="7">
-                  <c:v>99.13</c:v>
-                </c:pt>
-                <c:pt idx="8">
-                  <c:v>79.09</c:v>
-                </c:pt>
               </c:numCache>
+              <c:extLst/>
             </c:numRef>
           </c:val>
           <c:extLst>
             <c:ext xmlns:c16="http://schemas.microsoft.com/office/drawing/2014/chart" uri="{C3380CC4-5D6E-409C-BE32-E72D297353CC}">
-              <c16:uniqueId val="{00000002-02DD-4396-88D6-A814278DDB6B}"/>
+              <c16:uniqueId val="{00000002-2467-4A75-B78E-287C97D59854}"/>
             </c:ext>
           </c:extLst>
         </c:ser>
@@ -752,7 +801,7 @@
           <a:lstStyle/>
           <a:p>
             <a:pPr>
-              <a:defRPr sz="900" b="0" i="0" u="none" strike="noStrike" kern="1200" baseline="0">
+              <a:defRPr sz="1050" b="0" i="0" u="none" strike="noStrike" kern="1200" baseline="0">
                 <a:solidFill>
                   <a:schemeClr val="tx1">
                     <a:lumMod val="65000"/>
@@ -778,7 +827,7 @@
         <c:axId val="573606256"/>
         <c:scaling>
           <c:orientation val="minMax"/>
-          <c:max val="100"/>
+          <c:max val="50"/>
         </c:scaling>
         <c:delete val="0"/>
         <c:axPos val="l"/>
@@ -812,7 +861,7 @@
           <a:lstStyle/>
           <a:p>
             <a:pPr>
-              <a:defRPr sz="900" b="0" i="0" u="none" strike="noStrike" kern="1200" baseline="0">
+              <a:defRPr sz="1050" b="0" i="0" u="none" strike="noStrike" kern="1200" baseline="0">
                 <a:solidFill>
                   <a:schemeClr val="tx1">
                     <a:lumMod val="65000"/>
@@ -846,10 +895,10 @@
         <c:manualLayout>
           <c:xMode val="edge"/>
           <c:yMode val="edge"/>
-          <c:x val="8.5871828559968957E-2"/>
-          <c:y val="0.94330327868852459"/>
-          <c:w val="0.8044535573918894"/>
-          <c:h val="4.1825526932084307E-2"/>
+          <c:x val="7.3099055007130445E-2"/>
+          <c:y val="0.93636962973508697"/>
+          <c:w val="0.85380166802616908"/>
+          <c:h val="3.8595599750309378E-2"/>
         </c:manualLayout>
       </c:layout>
       <c:overlay val="0"/>
@@ -904,7 +953,7 @@
     <a:lstStyle/>
     <a:p>
       <a:pPr>
-        <a:defRPr/>
+        <a:defRPr sz="1050"/>
       </a:pPr>
       <a:endParaRPr lang="en-US"/>
     </a:p>
@@ -1589,7 +1638,7 @@
           <a:p>
             <a:fld id="{C38FC416-D271-418A-BB62-F5986F7BC879}" type="datetimeFigureOut">
               <a:rPr lang="en-US" smtClean="0"/>
-              <a:t>4/20/2023</a:t>
+              <a:t>4/21/2023</a:t>
             </a:fld>
             <a:endParaRPr lang="en-US"/>
           </a:p>
@@ -1759,7 +1808,7 @@
           <a:p>
             <a:fld id="{C38FC416-D271-418A-BB62-F5986F7BC879}" type="datetimeFigureOut">
               <a:rPr lang="en-US" smtClean="0"/>
-              <a:t>4/20/2023</a:t>
+              <a:t>4/21/2023</a:t>
             </a:fld>
             <a:endParaRPr lang="en-US"/>
           </a:p>
@@ -1939,7 +1988,7 @@
           <a:p>
             <a:fld id="{C38FC416-D271-418A-BB62-F5986F7BC879}" type="datetimeFigureOut">
               <a:rPr lang="en-US" smtClean="0"/>
-              <a:t>4/20/2023</a:t>
+              <a:t>4/21/2023</a:t>
             </a:fld>
             <a:endParaRPr lang="en-US"/>
           </a:p>
@@ -2109,7 +2158,7 @@
           <a:p>
             <a:fld id="{C38FC416-D271-418A-BB62-F5986F7BC879}" type="datetimeFigureOut">
               <a:rPr lang="en-US" smtClean="0"/>
-              <a:t>4/20/2023</a:t>
+              <a:t>4/21/2023</a:t>
             </a:fld>
             <a:endParaRPr lang="en-US"/>
           </a:p>
@@ -2355,7 +2404,7 @@
           <a:p>
             <a:fld id="{C38FC416-D271-418A-BB62-F5986F7BC879}" type="datetimeFigureOut">
               <a:rPr lang="en-US" smtClean="0"/>
-              <a:t>4/20/2023</a:t>
+              <a:t>4/21/2023</a:t>
             </a:fld>
             <a:endParaRPr lang="en-US"/>
           </a:p>
@@ -2587,7 +2636,7 @@
           <a:p>
             <a:fld id="{C38FC416-D271-418A-BB62-F5986F7BC879}" type="datetimeFigureOut">
               <a:rPr lang="en-US" smtClean="0"/>
-              <a:t>4/20/2023</a:t>
+              <a:t>4/21/2023</a:t>
             </a:fld>
             <a:endParaRPr lang="en-US"/>
           </a:p>
@@ -2954,7 +3003,7 @@
           <a:p>
             <a:fld id="{C38FC416-D271-418A-BB62-F5986F7BC879}" type="datetimeFigureOut">
               <a:rPr lang="en-US" smtClean="0"/>
-              <a:t>4/20/2023</a:t>
+              <a:t>4/21/2023</a:t>
             </a:fld>
             <a:endParaRPr lang="en-US"/>
           </a:p>
@@ -3072,7 +3121,7 @@
           <a:p>
             <a:fld id="{C38FC416-D271-418A-BB62-F5986F7BC879}" type="datetimeFigureOut">
               <a:rPr lang="en-US" smtClean="0"/>
-              <a:t>4/20/2023</a:t>
+              <a:t>4/21/2023</a:t>
             </a:fld>
             <a:endParaRPr lang="en-US"/>
           </a:p>
@@ -3167,7 +3216,7 @@
           <a:p>
             <a:fld id="{C38FC416-D271-418A-BB62-F5986F7BC879}" type="datetimeFigureOut">
               <a:rPr lang="en-US" smtClean="0"/>
-              <a:t>4/20/2023</a:t>
+              <a:t>4/21/2023</a:t>
             </a:fld>
             <a:endParaRPr lang="en-US"/>
           </a:p>
@@ -3444,7 +3493,7 @@
           <a:p>
             <a:fld id="{C38FC416-D271-418A-BB62-F5986F7BC879}" type="datetimeFigureOut">
               <a:rPr lang="en-US" smtClean="0"/>
-              <a:t>4/20/2023</a:t>
+              <a:t>4/21/2023</a:t>
             </a:fld>
             <a:endParaRPr lang="en-US"/>
           </a:p>
@@ -3701,7 +3750,7 @@
           <a:p>
             <a:fld id="{C38FC416-D271-418A-BB62-F5986F7BC879}" type="datetimeFigureOut">
               <a:rPr lang="en-US" smtClean="0"/>
-              <a:t>4/20/2023</a:t>
+              <a:t>4/21/2023</a:t>
             </a:fld>
             <a:endParaRPr lang="en-US"/>
           </a:p>
@@ -3914,7 +3963,7 @@
           <a:p>
             <a:fld id="{C38FC416-D271-418A-BB62-F5986F7BC879}" type="datetimeFigureOut">
               <a:rPr lang="en-US" smtClean="0"/>
-              <a:t>4/20/2023</a:t>
+              <a:t>4/21/2023</a:t>
             </a:fld>
             <a:endParaRPr lang="en-US"/>
           </a:p>
@@ -4434,7 +4483,7 @@
         </p:nvSpPr>
         <p:spPr>
           <a:xfrm>
-            <a:off x="201168" y="6330463"/>
+            <a:off x="201168" y="6252084"/>
             <a:ext cx="5022088" cy="276999"/>
           </a:xfrm>
           <a:prstGeom prst="rect">
@@ -4470,13 +4519,13 @@
           <p:nvPr>
             <p:extLst>
               <p:ext uri="{D42A27DB-BD31-4B8C-83A1-F6EECF244321}">
-                <p14:modId xmlns:p14="http://schemas.microsoft.com/office/powerpoint/2010/main" val="1421529820"/>
+                <p14:modId xmlns:p14="http://schemas.microsoft.com/office/powerpoint/2010/main" val="1877343376"/>
               </p:ext>
             </p:extLst>
           </p:nvPr>
         </p:nvGraphicFramePr>
         <p:xfrm>
-          <a:off x="5980938" y="969518"/>
+          <a:off x="5980938" y="1065317"/>
           <a:ext cx="6109462" cy="3271552"/>
         </p:xfrm>
         <a:graphic>
@@ -5024,12 +5073,12 @@
                     <a:p>
                       <a:pPr algn="l" fontAlgn="b"/>
                       <a:r>
-                        <a:rPr lang="en-US" sz="1400" u="none" strike="noStrike">
+                        <a:rPr lang="en-US" sz="1400" u="none" strike="noStrike" dirty="0">
                           <a:effectLst/>
                         </a:rPr>
                         <a:t>Experience with the variety</a:t>
                       </a:r>
-                      <a:endParaRPr lang="en-US" sz="1400" b="0" i="0" u="none" strike="noStrike">
+                      <a:endParaRPr lang="en-US" sz="1400" b="0" i="0" u="none" strike="noStrike" dirty="0">
                         <a:solidFill>
                           <a:srgbClr val="000000"/>
                         </a:solidFill>
@@ -5291,12 +5340,12 @@
                     <a:p>
                       <a:pPr algn="ctr" fontAlgn="b"/>
                       <a:r>
-                        <a:rPr lang="en-US" sz="1400" u="none" strike="noStrike">
+                        <a:rPr lang="en-US" sz="1400" u="none" strike="noStrike" dirty="0">
                           <a:effectLst/>
                         </a:rPr>
                         <a:t>3.56</a:t>
                       </a:r>
-                      <a:endParaRPr lang="en-US" sz="1400" b="0" i="0" u="none" strike="noStrike">
+                      <a:endParaRPr lang="en-US" sz="1400" b="0" i="0" u="none" strike="noStrike" dirty="0">
                         <a:solidFill>
                           <a:srgbClr val="000000"/>
                         </a:solidFill>
@@ -5788,14 +5837,14 @@
           <p:nvPr>
             <p:extLst>
               <p:ext uri="{D42A27DB-BD31-4B8C-83A1-F6EECF244321}">
-                <p14:modId xmlns:p14="http://schemas.microsoft.com/office/powerpoint/2010/main" val="1388410490"/>
+                <p14:modId xmlns:p14="http://schemas.microsoft.com/office/powerpoint/2010/main" val="1405418874"/>
               </p:ext>
             </p:extLst>
           </p:nvPr>
         </p:nvGraphicFramePr>
         <p:xfrm>
-          <a:off x="5990082" y="4491800"/>
-          <a:ext cx="6100318" cy="1731799"/>
+          <a:off x="5990082" y="4726940"/>
+          <a:ext cx="6100318" cy="1729075"/>
         </p:xfrm>
         <a:graphic>
           <a:graphicData uri="http://schemas.openxmlformats.org/drawingml/2006/table">
@@ -5888,14 +5937,14 @@
                   </a:txBody>
                   <a:tcPr marL="6350" marR="6350" marT="6350" marB="0" anchor="b"/>
                 </a:tc>
-                <a:tc rowSpan="5">
+                <a:tc rowSpan="6">
                   <a:txBody>
                     <a:bodyPr/>
                     <a:lstStyle/>
                     <a:p>
                       <a:pPr algn="just" rtl="0" fontAlgn="b"/>
                       <a:r>
-                        <a:rPr lang="en-US" sz="1350" b="0" i="1" u="none" strike="noStrike" dirty="0">
+                        <a:rPr lang="en-US" sz="1400" b="0" i="1" u="none" strike="noStrike" dirty="0">
                           <a:solidFill>
                             <a:srgbClr val="000000"/>
                           </a:solidFill>
@@ -6126,7 +6175,7 @@
                   </a:txBody>
                   <a:tcPr marL="6350" marR="6350" marT="6350" marB="0" anchor="b"/>
                 </a:tc>
-                <a:tc>
+                <a:tc vMerge="1">
                   <a:txBody>
                     <a:bodyPr/>
                     <a:lstStyle/>
@@ -6155,7 +6204,7 @@
       </p:graphicFrame>
       <p:graphicFrame>
         <p:nvGraphicFramePr>
-          <p:cNvPr id="6" name="Chart 5">
+          <p:cNvPr id="4" name="Chart 3">
             <a:extLst>
               <a:ext uri="{FF2B5EF4-FFF2-40B4-BE49-F238E27FC236}">
                 <a16:creationId xmlns:a16="http://schemas.microsoft.com/office/drawing/2014/main" id="{A88FD49A-429B-6F93-8031-0AB830B44790}"/>
@@ -6168,14 +6217,14 @@
           <p:nvPr>
             <p:extLst>
               <p:ext uri="{D42A27DB-BD31-4B8C-83A1-F6EECF244321}">
-                <p14:modId xmlns:p14="http://schemas.microsoft.com/office/powerpoint/2010/main" val="3877014089"/>
+                <p14:modId xmlns:p14="http://schemas.microsoft.com/office/powerpoint/2010/main" val="2127570720"/>
               </p:ext>
             </p:extLst>
           </p:nvPr>
         </p:nvGraphicFramePr>
         <p:xfrm>
-          <a:off x="333770" y="1032960"/>
-          <a:ext cx="5335510" cy="5124000"/>
+          <a:off x="287383" y="1146180"/>
+          <a:ext cx="5199112" cy="5010787"/>
         </p:xfrm>
         <a:graphic>
           <a:graphicData uri="http://schemas.openxmlformats.org/drawingml/2006/chart">
@@ -6247,7 +6296,7 @@
                   <a:srgbClr val="C00000"/>
                 </a:solidFill>
               </a:rPr>
-              <a:t>About Bazooka, the variety being promoted in the study/trails</a:t>
+              <a:t>About Bazooka; a hybrid maize variety that is being promoted in the trails in Uganda</a:t>
             </a:r>
           </a:p>
         </p:txBody>
@@ -6707,7 +6756,7 @@
                 <a:effectLst/>
                 <a:latin typeface="Calibri (Body)"/>
               </a:rPr>
-              <a:t>reeder/NARO: Tolerant to Maize lethal necrosis (MLN) and drought.</a:t>
+              <a:t>reeder/NARO: Tolerance to Maize lethal necrosis (MLN); and tolerance to drought.</a:t>
             </a:r>
           </a:p>
         </p:txBody>
@@ -8077,13 +8126,10 @@
             </a:pPr>
             <a:r>
               <a:rPr lang="en-US" sz="1500" dirty="0">
-                <a:solidFill>
-                  <a:srgbClr val="FF0000"/>
-                </a:solidFill>
                 <a:latin typeface="Calibri (Body)"/>
                 <a:cs typeface="Times New Roman" panose="02020603050405020304" pitchFamily="18" charset="0"/>
               </a:rPr>
-              <a:t>High cost of seed.</a:t>
+              <a:t>High cost of seed</a:t>
             </a:r>
           </a:p>
           <a:p>
@@ -8175,7 +8221,21 @@
                 <a:latin typeface="Calibri (Body)"/>
                 <a:cs typeface="Times New Roman" panose="02020603050405020304" pitchFamily="18" charset="0"/>
               </a:rPr>
-              <a:t>Providing farmers with trial packs (discounted and paid) to experiment and learn .</a:t>
+              <a:t>Providing farmers with discounted and paid trial </a:t>
+            </a:r>
+            <a:r>
+              <a:rPr lang="en-US" sz="1500">
+                <a:latin typeface="Calibri (Body)"/>
+                <a:cs typeface="Times New Roman" panose="02020603050405020304" pitchFamily="18" charset="0"/>
+              </a:rPr>
+              <a:t>packs to </a:t>
+            </a:r>
+            <a:r>
+              <a:rPr lang="en-US" sz="1500" dirty="0">
+                <a:latin typeface="Calibri (Body)"/>
+                <a:cs typeface="Times New Roman" panose="02020603050405020304" pitchFamily="18" charset="0"/>
+              </a:rPr>
+              <a:t>experiment and learn .</a:t>
             </a:r>
           </a:p>
           <a:p>

</xml_diff>